<commit_message>
mda and tweening slide updates
</commit_message>
<xml_diff>
--- a/slides/Tweening.pptx
+++ b/slides/Tweening.pptx
@@ -5244,7 +5244,7 @@
               <a:rPr lang="en-US" sz="1400" i="1" dirty="0">
                 <a:latin typeface="Calibri" panose="020F0502020204030204" pitchFamily="34" charset="0"/>
               </a:rPr>
-              <a:t>	private </a:t>
+              <a:t>	private static </a:t>
             </a:r>
             <a:r>
               <a:rPr lang="en-US" sz="1400" i="1" dirty="0" err="1">
@@ -9314,25 +9314,8 @@
                 <a:latin typeface="Calibri" panose="020F0502020204030204" pitchFamily="34" charset="0"/>
                 <a:ea typeface="ＭＳ Ｐゴシック"/>
               </a:rPr>
-              <a:t>, 2.0, </a:t>
-            </a:r>
-            <a:r>
-              <a:rPr lang="en-US" sz="1600" dirty="0" smtClean="0">
-                <a:solidFill>
-                  <a:srgbClr val="000000"/>
-                </a:solidFill>
-                <a:latin typeface="Calibri" panose="020F0502020204030204" pitchFamily="34" charset="0"/>
-                <a:ea typeface="ＭＳ Ｐゴシック"/>
-              </a:rPr>
-              <a:t>500);</a:t>
-            </a:r>
-            <a:endParaRPr lang="en-US" sz="1600" dirty="0">
-              <a:solidFill>
-                <a:srgbClr val="000000"/>
-              </a:solidFill>
-              <a:latin typeface="Calibri" panose="020F0502020204030204" pitchFamily="34" charset="0"/>
-              <a:ea typeface="ＭＳ Ｐゴシック"/>
-            </a:endParaRPr>
+              <a:t>, 2.0, 500);</a:t>
+            </a:r>
           </a:p>
           <a:p>
             <a:pPr>

</xml_diff>